<commit_message>
Homework for Workshop 3
</commit_message>
<xml_diff>
--- a/3/presentation/Angular 3.pptx
+++ b/3/presentation/Angular 3.pptx
@@ -221,7 +221,7 @@
           <a:p>
             <a:fld id="{A7D59A82-B575-4226-8A09-A5B072479177}" type="datetimeFigureOut">
               <a:rPr lang="pl-PL" smtClean="0"/>
-              <a:t>18.11.2020</a:t>
+              <a:t>20.11.2020</a:t>
             </a:fld>
             <a:endParaRPr lang="pl-PL"/>
           </a:p>
@@ -1622,7 +1622,7 @@
           <a:p>
             <a:fld id="{5E543113-3ECC-4DC9-B636-16B32516798D}" type="datetimeFigureOut">
               <a:rPr lang="pl-PL" smtClean="0"/>
-              <a:t>18.11.2020</a:t>
+              <a:t>20.11.2020</a:t>
             </a:fld>
             <a:endParaRPr lang="pl-PL"/>
           </a:p>
@@ -1822,7 +1822,7 @@
           <a:p>
             <a:fld id="{5E543113-3ECC-4DC9-B636-16B32516798D}" type="datetimeFigureOut">
               <a:rPr lang="pl-PL" smtClean="0"/>
-              <a:t>18.11.2020</a:t>
+              <a:t>20.11.2020</a:t>
             </a:fld>
             <a:endParaRPr lang="pl-PL"/>
           </a:p>
@@ -2032,7 +2032,7 @@
           <a:p>
             <a:fld id="{5E543113-3ECC-4DC9-B636-16B32516798D}" type="datetimeFigureOut">
               <a:rPr lang="pl-PL" smtClean="0"/>
-              <a:t>18.11.2020</a:t>
+              <a:t>20.11.2020</a:t>
             </a:fld>
             <a:endParaRPr lang="pl-PL"/>
           </a:p>
@@ -2232,7 +2232,7 @@
           <a:p>
             <a:fld id="{5E543113-3ECC-4DC9-B636-16B32516798D}" type="datetimeFigureOut">
               <a:rPr lang="pl-PL" smtClean="0"/>
-              <a:t>18.11.2020</a:t>
+              <a:t>20.11.2020</a:t>
             </a:fld>
             <a:endParaRPr lang="pl-PL"/>
           </a:p>
@@ -2508,7 +2508,7 @@
           <a:p>
             <a:fld id="{5E543113-3ECC-4DC9-B636-16B32516798D}" type="datetimeFigureOut">
               <a:rPr lang="pl-PL" smtClean="0"/>
-              <a:t>18.11.2020</a:t>
+              <a:t>20.11.2020</a:t>
             </a:fld>
             <a:endParaRPr lang="pl-PL"/>
           </a:p>
@@ -2776,7 +2776,7 @@
           <a:p>
             <a:fld id="{5E543113-3ECC-4DC9-B636-16B32516798D}" type="datetimeFigureOut">
               <a:rPr lang="pl-PL" smtClean="0"/>
-              <a:t>18.11.2020</a:t>
+              <a:t>20.11.2020</a:t>
             </a:fld>
             <a:endParaRPr lang="pl-PL"/>
           </a:p>
@@ -3191,7 +3191,7 @@
           <a:p>
             <a:fld id="{5E543113-3ECC-4DC9-B636-16B32516798D}" type="datetimeFigureOut">
               <a:rPr lang="pl-PL" smtClean="0"/>
-              <a:t>18.11.2020</a:t>
+              <a:t>20.11.2020</a:t>
             </a:fld>
             <a:endParaRPr lang="pl-PL"/>
           </a:p>
@@ -3333,7 +3333,7 @@
           <a:p>
             <a:fld id="{5E543113-3ECC-4DC9-B636-16B32516798D}" type="datetimeFigureOut">
               <a:rPr lang="pl-PL" smtClean="0"/>
-              <a:t>18.11.2020</a:t>
+              <a:t>20.11.2020</a:t>
             </a:fld>
             <a:endParaRPr lang="pl-PL"/>
           </a:p>
@@ -3446,7 +3446,7 @@
           <a:p>
             <a:fld id="{5E543113-3ECC-4DC9-B636-16B32516798D}" type="datetimeFigureOut">
               <a:rPr lang="pl-PL" smtClean="0"/>
-              <a:t>18.11.2020</a:t>
+              <a:t>20.11.2020</a:t>
             </a:fld>
             <a:endParaRPr lang="pl-PL"/>
           </a:p>
@@ -3759,7 +3759,7 @@
           <a:p>
             <a:fld id="{5E543113-3ECC-4DC9-B636-16B32516798D}" type="datetimeFigureOut">
               <a:rPr lang="pl-PL" smtClean="0"/>
-              <a:t>18.11.2020</a:t>
+              <a:t>20.11.2020</a:t>
             </a:fld>
             <a:endParaRPr lang="pl-PL"/>
           </a:p>
@@ -4048,7 +4048,7 @@
           <a:p>
             <a:fld id="{5E543113-3ECC-4DC9-B636-16B32516798D}" type="datetimeFigureOut">
               <a:rPr lang="pl-PL" smtClean="0"/>
-              <a:t>18.11.2020</a:t>
+              <a:t>20.11.2020</a:t>
             </a:fld>
             <a:endParaRPr lang="pl-PL"/>
           </a:p>
@@ -4291,7 +4291,7 @@
           <a:p>
             <a:fld id="{5E543113-3ECC-4DC9-B636-16B32516798D}" type="datetimeFigureOut">
               <a:rPr lang="pl-PL" smtClean="0"/>
-              <a:t>18.11.2020</a:t>
+              <a:t>20.11.2020</a:t>
             </a:fld>
             <a:endParaRPr lang="pl-PL"/>
           </a:p>
@@ -11800,31 +11800,38 @@
           </a:p>
         </p:txBody>
       </p:sp>
-      <p:sp>
-        <p:nvSpPr>
-          <p:cNvPr id="5" name="Content Placeholder 4">
+      <p:pic>
+        <p:nvPicPr>
+          <p:cNvPr id="4" name="Content Placeholder 3">
             <a:extLst>
               <a:ext uri="{FF2B5EF4-FFF2-40B4-BE49-F238E27FC236}">
-                <a16:creationId xmlns:a16="http://schemas.microsoft.com/office/drawing/2014/main" id="{0BEFEF05-E9E3-4856-8A0B-4A733B68F819}"/>
+                <a16:creationId xmlns:a16="http://schemas.microsoft.com/office/drawing/2014/main" id="{53AFDA3A-E641-436C-938A-4DDB1DE5A048}"/>
               </a:ext>
             </a:extLst>
           </p:cNvPr>
-          <p:cNvSpPr>
-            <a:spLocks noGrp="1"/>
-          </p:cNvSpPr>
+          <p:cNvPicPr>
+            <a:picLocks noGrp="1" noChangeAspect="1"/>
+          </p:cNvPicPr>
           <p:nvPr>
             <p:ph sz="half" idx="2"/>
           </p:nvPr>
-        </p:nvSpPr>
-        <p:spPr/>
-        <p:txBody>
-          <a:bodyPr/>
-          <a:lstStyle/>
-          <a:p>
-            <a:endParaRPr lang="pl-PL"/>
-          </a:p>
-        </p:txBody>
-      </p:sp>
+        </p:nvPicPr>
+        <p:blipFill>
+          <a:blip r:embed="rId2"/>
+          <a:stretch>
+            <a:fillRect/>
+          </a:stretch>
+        </p:blipFill>
+        <p:spPr>
+          <a:xfrm>
+            <a:off x="6172202" y="1946412"/>
+            <a:ext cx="5181600" cy="1915203"/>
+          </a:xfrm>
+          <a:prstGeom prst="rect">
+            <a:avLst/>
+          </a:prstGeom>
+        </p:spPr>
+      </p:pic>
     </p:spTree>
     <p:extLst>
       <p:ext uri="{BB962C8B-B14F-4D97-AF65-F5344CB8AC3E}">

</xml_diff>